<commit_message>
Both HiSPARC chapter drafts completed and out for review
01/02/2021
</commit_message>
<xml_diff>
--- a/Thesis/Appendices/HS14008-GLE-sims/artificial_flow_chart.pptx
+++ b/Thesis/Appendices/HS14008-GLE-sims/artificial_flow_chart.pptx
@@ -6,6 +6,7 @@
   </p:sldMasterIdLst>
   <p:sldIdLst>
     <p:sldId id="256" r:id="rId3"/>
+    <p:sldId id="257" r:id="rId4"/>
   </p:sldIdLst>
   <p:sldSz cx="6858000" cy="9903460" type="A4"/>
   <p:notesSz cx="7103745" cy="10234295"/>
@@ -2635,8 +2636,8 @@
         </p:nvSpPr>
         <p:spPr>
           <a:xfrm>
-            <a:off x="1135380" y="2513965"/>
-            <a:ext cx="2164715" cy="645160"/>
+            <a:off x="1122680" y="3528695"/>
+            <a:ext cx="2167890" cy="645160"/>
           </a:xfrm>
           <a:prstGeom prst="rect">
             <a:avLst/>
@@ -2679,7 +2680,7 @@
         </p:nvSpPr>
         <p:spPr>
           <a:xfrm>
-            <a:off x="1133508" y="945170"/>
+            <a:off x="1123983" y="907070"/>
             <a:ext cx="2166348" cy="275590"/>
           </a:xfrm>
           <a:prstGeom prst="rect">
@@ -2705,23 +2706,7 @@
                   <a:schemeClr val="bg1"/>
                 </a:solidFill>
               </a:rPr>
-              <a:t>Set </a:t>
-            </a:r>
-            <a:r>
-              <a:rPr lang="" altLang="en-US" sz="1200" b="1">
-                <a:solidFill>
-                  <a:schemeClr val="bg1"/>
-                </a:solidFill>
-              </a:rPr>
-              <a:t>GLE </a:t>
-            </a:r>
-            <a:r>
-              <a:rPr lang="en-US" altLang="en-US" sz="1200" b="1">
-                <a:solidFill>
-                  <a:schemeClr val="bg1"/>
-                </a:solidFill>
-              </a:rPr>
-              <a:t>times (t</a:t>
+              <a:t>Set GLE times (t</a:t>
             </a:r>
             <a:r>
               <a:rPr lang="en-US" altLang="en-US" sz="1200" b="1" baseline="-25000">
@@ -2755,7 +2740,7 @@
         </p:nvSpPr>
         <p:spPr>
           <a:xfrm>
-            <a:off x="1132873" y="2513334"/>
+            <a:off x="1123348" y="3528064"/>
             <a:ext cx="2166348" cy="580390"/>
           </a:xfrm>
           <a:prstGeom prst="rect">
@@ -2776,21 +2761,21 @@
           </a:bodyPr>
           <a:p>
             <a:r>
-              <a:rPr lang="" altLang="en-US" sz="1200" b="1">
+              <a:rPr lang="en-US" altLang="en-US" sz="1200" b="1">
                 <a:solidFill>
                   <a:schemeClr val="bg1"/>
                 </a:solidFill>
               </a:rPr>
               <a:t>Compute each model GLE and generate data</a:t>
             </a:r>
-            <a:endParaRPr lang="" altLang="en-US" sz="1200" b="1">
+            <a:endParaRPr lang="en-US" altLang="en-US" sz="1200" b="1">
               <a:solidFill>
                 <a:schemeClr val="bg1"/>
               </a:solidFill>
             </a:endParaRPr>
           </a:p>
           <a:p>
-            <a:endParaRPr lang="" altLang="en-US" sz="1200" b="1" baseline="-25000">
+            <a:endParaRPr lang="en-US" altLang="en-US" sz="1200" b="1" baseline="-25000">
               <a:solidFill>
                 <a:schemeClr val="bg1"/>
               </a:solidFill>
@@ -2807,7 +2792,7 @@
         </p:nvSpPr>
         <p:spPr>
           <a:xfrm>
-            <a:off x="94615" y="942975"/>
+            <a:off x="85090" y="904875"/>
             <a:ext cx="536575" cy="275590"/>
           </a:xfrm>
           <a:prstGeom prst="rect">
@@ -2852,8 +2837,8 @@
         </p:nvSpPr>
         <p:spPr>
           <a:xfrm>
-            <a:off x="161290" y="2517140"/>
-            <a:ext cx="536575" cy="275590"/>
+            <a:off x="177800" y="2603500"/>
+            <a:ext cx="536575" cy="645160"/>
           </a:xfrm>
           <a:prstGeom prst="rect">
             <a:avLst/>
@@ -2870,20 +2855,35 @@
           <a:p>
             <a:pPr algn="ctr"/>
             <a:r>
-              <a:rPr lang="" altLang="en-US" sz="1200" b="1">
+              <a:rPr lang="en-US" altLang="en-US" sz="1200" b="1">
                 <a:latin typeface="Ubuntu" panose="020B0604030602030204" charset="0"/>
                 <a:ea typeface="Ubuntu" panose="020B0604030602030204" charset="0"/>
               </a:rPr>
               <a:t>λ</a:t>
             </a:r>
             <a:r>
+              <a:rPr lang="en-US" altLang="en-US" sz="1200" b="1"/>
+              <a:t>, A</a:t>
+            </a:r>
+            <a:r>
               <a:rPr lang="" altLang="en-US" sz="1200" b="1"/>
               <a:t>, </a:t>
             </a:r>
             <a:r>
-              <a:rPr lang="en-US" altLang="en-US" sz="1200" b="1"/>
-              <a:t>A</a:t>
-            </a:r>
+              <a:rPr lang="en-US" altLang="en-US" sz="1200" b="1">
+                <a:latin typeface="Ubuntu" panose="020B0604030602030204" charset="0"/>
+                <a:ea typeface="Ubuntu" panose="020B0604030602030204" charset="0"/>
+                <a:sym typeface="+mn-ea"/>
+              </a:rPr>
+              <a:t>σ</a:t>
+            </a:r>
+            <a:endParaRPr lang="en-US" altLang="en-US" sz="1200" b="1">
+              <a:latin typeface="Ubuntu" panose="020B0604030602030204" charset="0"/>
+              <a:ea typeface="Ubuntu" panose="020B0604030602030204" charset="0"/>
+            </a:endParaRPr>
+          </a:p>
+          <a:p>
+            <a:pPr algn="ctr"/>
             <a:endParaRPr lang="en-US" altLang="en-US" sz="1200" b="1"/>
           </a:p>
         </p:txBody>
@@ -2896,7 +2896,7 @@
         </p:nvSpPr>
         <p:spPr>
           <a:xfrm>
-            <a:off x="3300095" y="945515"/>
+            <a:off x="3290570" y="907415"/>
             <a:ext cx="2868295" cy="275590"/>
           </a:xfrm>
           <a:prstGeom prst="rect">
@@ -2915,34 +2915,22 @@
           </a:bodyPr>
           <a:p>
             <a:r>
-              <a:rPr lang="" altLang="en-US" sz="1200"/>
-              <a:t>F</a:t>
-            </a:r>
-            <a:r>
               <a:rPr lang="en-US" altLang="en-US" sz="1200"/>
-              <a:t>rom uniform distribution</a:t>
-            </a:r>
-            <a:r>
-              <a:rPr lang="" altLang="en-US" sz="1200"/>
-              <a:t>:</a:t>
-            </a:r>
-            <a:r>
-              <a:rPr lang="en-US" altLang="en-US" sz="1200"/>
-              <a:t> </a:t>
-            </a:r>
-            <a:r>
-              <a:rPr lang="" altLang="en-US" sz="1200" b="1"/>
+              <a:t>From uniform distribution: </a:t>
+            </a:r>
+            <a:r>
+              <a:rPr lang="en-US" altLang="en-US" sz="1200" b="1"/>
               <a:t>U(0,T</a:t>
             </a:r>
             <a:r>
-              <a:rPr lang="" altLang="en-US" sz="1200" b="1" baseline="-25000"/>
+              <a:rPr lang="en-US" altLang="en-US" sz="1200" b="1" baseline="-25000"/>
               <a:t>d</a:t>
             </a:r>
             <a:r>
-              <a:rPr lang="" altLang="en-US" sz="1200" b="1"/>
+              <a:rPr lang="en-US" altLang="en-US" sz="1200" b="1"/>
               <a:t>)</a:t>
             </a:r>
-            <a:endParaRPr lang="" altLang="en-US" sz="1200" b="1"/>
+            <a:endParaRPr lang="en-US" altLang="en-US" sz="1200" b="1"/>
           </a:p>
         </p:txBody>
       </p:sp>
@@ -2954,7 +2942,7 @@
         </p:nvSpPr>
         <p:spPr>
           <a:xfrm>
-            <a:off x="3299460" y="1545590"/>
+            <a:off x="3289935" y="1536065"/>
             <a:ext cx="2868930" cy="645160"/>
           </a:xfrm>
           <a:prstGeom prst="rect">
@@ -2973,26 +2961,14 @@
           </a:bodyPr>
           <a:p>
             <a:r>
-              <a:rPr lang="" sz="1200"/>
+              <a:rPr lang="en-US" sz="1200"/>
               <a:t>F</a:t>
             </a:r>
             <a:r>
               <a:rPr lang="en-US" altLang="en-US" sz="1200"/>
-              <a:t>rom </a:t>
-            </a:r>
-            <a:r>
-              <a:rPr lang="" altLang="en-US" sz="1200"/>
-              <a:t>uniform</a:t>
-            </a:r>
-            <a:r>
-              <a:rPr lang="en-US" altLang="en-US" sz="1200"/>
-              <a:t> distribution based on </a:t>
-            </a:r>
-            <a:r>
-              <a:rPr lang="" altLang="en-US" sz="1200"/>
-              <a:t>Strauss et al. (2017), ensuring: </a:t>
-            </a:r>
-            <a:endParaRPr lang="" altLang="en-US" sz="1200"/>
+              <a:t>rom uniform distribution based on Strauss et al. (2017), ensuring: </a:t>
+            </a:r>
+            <a:endParaRPr lang="en-US" altLang="en-US" sz="1200"/>
           </a:p>
           <a:p>
             <a:r>
@@ -3004,7 +2980,7 @@
               <a:t>τ</a:t>
             </a:r>
             <a:r>
-              <a:rPr lang="" altLang="en-US" sz="1200" baseline="-25000">
+              <a:rPr lang="en-US" altLang="en-US" sz="1200" baseline="-25000">
                 <a:latin typeface="Ubuntu" panose="020B0604030602030204" charset="0"/>
                 <a:ea typeface="Ubuntu" panose="020B0604030602030204" charset="0"/>
                 <a:sym typeface="+mn-ea"/>
@@ -3012,7 +2988,7 @@
               <a:t>d </a:t>
             </a:r>
             <a:r>
-              <a:rPr lang="" altLang="en-US" sz="1200">
+              <a:rPr lang="en-US" altLang="en-US" sz="1200">
                 <a:latin typeface="Ubuntu" panose="020B0604030602030204" charset="0"/>
                 <a:ea typeface="Ubuntu" panose="020B0604030602030204" charset="0"/>
                 <a:sym typeface="+mn-ea"/>
@@ -3020,27 +2996,27 @@
               <a:t>&gt; 3.5 </a:t>
             </a:r>
             <a:r>
-              <a:rPr lang="" altLang="en-US" sz="1200">
+              <a:rPr lang="en-US" altLang="en-US" sz="1200">
                 <a:latin typeface="Ubuntu" panose="020B0604030602030204" charset="0"/>
                 <a:ea typeface="Ubuntu" panose="020B0604030602030204" charset="0"/>
               </a:rPr>
               <a:t>τ</a:t>
             </a:r>
             <a:r>
-              <a:rPr lang="" altLang="en-US" sz="1200" baseline="-25000">
+              <a:rPr lang="en-US" altLang="en-US" sz="1200" baseline="-25000">
                 <a:latin typeface="Ubuntu" panose="020B0604030602030204" charset="0"/>
                 <a:ea typeface="Ubuntu" panose="020B0604030602030204" charset="0"/>
               </a:rPr>
               <a:t>r</a:t>
             </a:r>
             <a:r>
-              <a:rPr lang="" altLang="en-US" sz="1200">
+              <a:rPr lang="en-US" altLang="en-US" sz="1200">
                 <a:latin typeface="Ubuntu" panose="020B0604030602030204" charset="0"/>
                 <a:ea typeface="Ubuntu" panose="020B0604030602030204" charset="0"/>
               </a:rPr>
               <a:t> </a:t>
             </a:r>
-            <a:endParaRPr lang="" altLang="en-US" sz="1200"/>
+            <a:endParaRPr lang="en-US" altLang="en-US" sz="1200"/>
           </a:p>
         </p:txBody>
       </p:sp>
@@ -3052,7 +3028,7 @@
         </p:nvSpPr>
         <p:spPr>
           <a:xfrm>
-            <a:off x="3299460" y="2513330"/>
+            <a:off x="3289935" y="3528060"/>
             <a:ext cx="2868295" cy="645160"/>
           </a:xfrm>
           <a:prstGeom prst="rect">
@@ -3080,22 +3056,38 @@
           </a:bodyPr>
           <a:p>
             <a:r>
+              <a:rPr lang="en-US" altLang="en-US" sz="1200">
+                <a:solidFill>
+                  <a:schemeClr val="tx1"/>
+                </a:solidFill>
+              </a:rPr>
+              <a:t>For each datapoint </a:t>
+            </a:r>
+            <a:r>
               <a:rPr lang="" altLang="en-US" sz="1200">
                 <a:solidFill>
                   <a:schemeClr val="tx1"/>
                 </a:solidFill>
               </a:rPr>
-              <a:t>For each model datapoint, draw simulated data from Poisson distribution: </a:t>
-            </a:r>
-            <a:r>
-              <a:rPr lang="" altLang="en-US" sz="1200" b="1">
+              <a:t>in the model</a:t>
+            </a:r>
+            <a:r>
+              <a:rPr lang="en-US" altLang="en-US" sz="1200">
                 <a:solidFill>
                   <a:schemeClr val="tx1"/>
                 </a:solidFill>
               </a:rPr>
+              <a:t>, draw simulated data from Poisson distribution: </a:t>
+            </a:r>
+            <a:r>
+              <a:rPr lang="en-US" altLang="en-US" sz="1200" b="1">
+                <a:solidFill>
+                  <a:schemeClr val="tx1"/>
+                </a:solidFill>
+              </a:rPr>
               <a:t>Po(x)</a:t>
             </a:r>
-            <a:endParaRPr lang="" altLang="en-US" sz="1200" b="1" baseline="-25000">
+            <a:endParaRPr lang="en-US" altLang="en-US" sz="1200" b="1" baseline="-25000">
               <a:solidFill>
                 <a:schemeClr val="tx1"/>
               </a:solidFill>
@@ -3112,7 +3104,7 @@
         </p:nvSpPr>
         <p:spPr>
           <a:xfrm>
-            <a:off x="2482883" y="4362548"/>
+            <a:off x="2473358" y="5358228"/>
             <a:ext cx="2166348" cy="460375"/>
           </a:xfrm>
           <a:prstGeom prst="rect">
@@ -3134,14 +3126,14 @@
           <a:p>
             <a:pPr algn="ctr"/>
             <a:r>
-              <a:rPr lang="" altLang="en-US" sz="1200" b="1">
+              <a:rPr lang="en-US" altLang="en-US" sz="1200" b="1">
                 <a:solidFill>
                   <a:schemeClr val="bg1"/>
                 </a:solidFill>
               </a:rPr>
               <a:t>Run statistics tests on each time-series</a:t>
             </a:r>
-            <a:endParaRPr lang="" altLang="en-US" sz="1200" b="1">
+            <a:endParaRPr lang="en-US" altLang="en-US" sz="1200" b="1">
               <a:solidFill>
                 <a:schemeClr val="bg1"/>
               </a:solidFill>
@@ -3157,7 +3149,7 @@
         </p:nvCxnSpPr>
         <p:spPr>
           <a:xfrm>
-            <a:off x="570865" y="1079500"/>
+            <a:off x="561340" y="1041400"/>
             <a:ext cx="546100" cy="0"/>
           </a:xfrm>
           <a:prstGeom prst="straightConnector1">
@@ -3191,8 +3183,8 @@
         </p:nvCxnSpPr>
         <p:spPr>
           <a:xfrm>
-            <a:off x="614045" y="2651125"/>
-            <a:ext cx="502920" cy="0"/>
+            <a:off x="630555" y="2851785"/>
+            <a:ext cx="476885" cy="3810"/>
           </a:xfrm>
           <a:prstGeom prst="straightConnector1">
             <a:avLst/>
@@ -3225,7 +3217,7 @@
         </p:nvCxnSpPr>
         <p:spPr>
           <a:xfrm>
-            <a:off x="2216785" y="1297305"/>
+            <a:off x="2207260" y="1287780"/>
             <a:ext cx="0" cy="198120"/>
           </a:xfrm>
           <a:prstGeom prst="straightConnector1">
@@ -3259,8 +3251,8 @@
         </p:nvSpPr>
         <p:spPr>
           <a:xfrm>
-            <a:off x="742950" y="716280"/>
-            <a:ext cx="5646420" cy="3301365"/>
+            <a:off x="733425" y="716280"/>
+            <a:ext cx="5646420" cy="4256405"/>
           </a:xfrm>
           <a:prstGeom prst="rect">
             <a:avLst/>
@@ -3307,7 +3299,7 @@
         </p:nvCxnSpPr>
         <p:spPr>
           <a:xfrm flipH="1">
-            <a:off x="3567430" y="4087495"/>
+            <a:off x="3557905" y="5083175"/>
             <a:ext cx="4445" cy="213360"/>
           </a:xfrm>
           <a:prstGeom prst="straightConnector1">
@@ -3341,7 +3333,7 @@
         </p:nvSpPr>
         <p:spPr>
           <a:xfrm>
-            <a:off x="1135413" y="1545880"/>
+            <a:off x="1125888" y="1536355"/>
             <a:ext cx="2166348" cy="645160"/>
           </a:xfrm>
           <a:prstGeom prst="rect">
@@ -3409,8 +3401,8 @@
         </p:nvSpPr>
         <p:spPr>
           <a:xfrm>
-            <a:off x="1133508" y="3471891"/>
-            <a:ext cx="2166348" cy="275590"/>
+            <a:off x="1122045" y="4525010"/>
+            <a:ext cx="2168525" cy="275590"/>
           </a:xfrm>
           <a:prstGeom prst="rect">
             <a:avLst/>
@@ -3430,14 +3422,14 @@
           </a:bodyPr>
           <a:p>
             <a:r>
-              <a:rPr lang="" altLang="en-US" sz="1200" b="1">
+              <a:rPr lang="en-US" altLang="en-US" sz="1200" b="1">
                 <a:solidFill>
                   <a:schemeClr val="bg1"/>
                 </a:solidFill>
               </a:rPr>
               <a:t>Add noise to each data set</a:t>
             </a:r>
-            <a:endParaRPr lang="" altLang="en-US" sz="1200" b="1" baseline="-25000">
+            <a:endParaRPr lang="en-US" altLang="en-US" sz="1200" b="1" baseline="-25000">
               <a:solidFill>
                 <a:schemeClr val="bg1"/>
               </a:solidFill>
@@ -3454,7 +3446,7 @@
         </p:nvSpPr>
         <p:spPr>
           <a:xfrm>
-            <a:off x="3300095" y="3472180"/>
+            <a:off x="3290570" y="4525010"/>
             <a:ext cx="2868930" cy="275590"/>
           </a:xfrm>
           <a:prstGeom prst="rect">
@@ -3474,15 +3466,7 @@
           <a:p>
             <a:r>
               <a:rPr lang="en-US" altLang="en-US" sz="1200"/>
-              <a:t>Drawn from </a:t>
-            </a:r>
-            <a:r>
-              <a:rPr lang="" altLang="en-US" sz="1200"/>
-              <a:t>Poisson </a:t>
-            </a:r>
-            <a:r>
-              <a:rPr lang="en-US" altLang="en-US" sz="1200"/>
-              <a:t>distribution</a:t>
+              <a:t>Drawn from Poisson distribution</a:t>
             </a:r>
             <a:r>
               <a:rPr lang="en-US" altLang="en-US" sz="1200">
@@ -3514,79 +3498,6 @@
           </a:p>
         </p:txBody>
       </p:sp>
-      <p:sp>
-        <p:nvSpPr>
-          <p:cNvPr id="22" name="Text Box 21"/>
-          <p:cNvSpPr txBox="1"/>
-          <p:nvPr/>
-        </p:nvSpPr>
-        <p:spPr>
-          <a:xfrm>
-            <a:off x="94615" y="3472180"/>
-            <a:ext cx="536575" cy="275590"/>
-          </a:xfrm>
-          <a:prstGeom prst="rect">
-            <a:avLst/>
-          </a:prstGeom>
-          <a:noFill/>
-          <a:ln>
-            <a:noFill/>
-          </a:ln>
-        </p:spPr>
-        <p:txBody>
-          <a:bodyPr wrap="square" rtlCol="0">
-            <a:spAutoFit/>
-          </a:bodyPr>
-          <a:p>
-            <a:pPr algn="ctr"/>
-            <a:r>
-              <a:rPr lang="en-US" altLang="en-US" sz="1200" b="1">
-                <a:latin typeface="Ubuntu" panose="020B0604030602030204" charset="0"/>
-                <a:ea typeface="Ubuntu" panose="020B0604030602030204" charset="0"/>
-              </a:rPr>
-              <a:t>σ</a:t>
-            </a:r>
-            <a:endParaRPr lang="en-US" altLang="en-US" sz="1200" b="1">
-              <a:latin typeface="Ubuntu" panose="020B0604030602030204" charset="0"/>
-              <a:ea typeface="Ubuntu" panose="020B0604030602030204" charset="0"/>
-            </a:endParaRPr>
-          </a:p>
-        </p:txBody>
-      </p:sp>
-      <p:cxnSp>
-        <p:nvCxnSpPr>
-          <p:cNvPr id="27" name="Straight Arrow Connector 26"/>
-          <p:cNvCxnSpPr/>
-          <p:nvPr/>
-        </p:nvCxnSpPr>
-        <p:spPr>
-          <a:xfrm>
-            <a:off x="462280" y="3609975"/>
-            <a:ext cx="654685" cy="0"/>
-          </a:xfrm>
-          <a:prstGeom prst="straightConnector1">
-            <a:avLst/>
-          </a:prstGeom>
-          <a:ln w="19050">
-            <a:headEnd type="none"/>
-            <a:tailEnd type="triangle" w="med" len="med"/>
-          </a:ln>
-        </p:spPr>
-        <p:style>
-          <a:lnRef idx="1">
-            <a:schemeClr val="dk1"/>
-          </a:lnRef>
-          <a:fillRef idx="0">
-            <a:schemeClr val="dk1"/>
-          </a:fillRef>
-          <a:effectRef idx="0">
-            <a:schemeClr val="dk1"/>
-          </a:effectRef>
-          <a:fontRef idx="minor">
-            <a:schemeClr val="tx1"/>
-          </a:fontRef>
-        </p:style>
-      </p:cxnSp>
       <p:cxnSp>
         <p:nvCxnSpPr>
           <p:cNvPr id="30" name="Straight Arrow Connector 29"/>
@@ -3595,7 +3506,7 @@
         </p:nvCxnSpPr>
         <p:spPr>
           <a:xfrm>
-            <a:off x="2216785" y="2267585"/>
+            <a:off x="2207260" y="3282315"/>
             <a:ext cx="0" cy="198120"/>
           </a:xfrm>
           <a:prstGeom prst="straightConnector1">
@@ -3629,8 +3540,1255 @@
         </p:nvCxnSpPr>
         <p:spPr>
           <a:xfrm>
-            <a:off x="2216785" y="3225800"/>
+            <a:off x="2207260" y="4278630"/>
             <a:ext cx="0" cy="198120"/>
+          </a:xfrm>
+          <a:prstGeom prst="straightConnector1">
+            <a:avLst/>
+          </a:prstGeom>
+          <a:ln w="19050">
+            <a:headEnd type="none"/>
+            <a:tailEnd type="triangle" w="med" len="med"/>
+          </a:ln>
+        </p:spPr>
+        <p:style>
+          <a:lnRef idx="1">
+            <a:schemeClr val="dk1"/>
+          </a:lnRef>
+          <a:fillRef idx="0">
+            <a:schemeClr val="dk1"/>
+          </a:fillRef>
+          <a:effectRef idx="0">
+            <a:schemeClr val="dk1"/>
+          </a:effectRef>
+          <a:fontRef idx="minor">
+            <a:schemeClr val="tx1"/>
+          </a:fontRef>
+        </p:style>
+      </p:cxnSp>
+      <p:sp>
+        <p:nvSpPr>
+          <p:cNvPr id="5" name="Text Box 4"/>
+          <p:cNvSpPr txBox="1"/>
+          <p:nvPr/>
+        </p:nvSpPr>
+        <p:spPr>
+          <a:xfrm>
+            <a:off x="3290570" y="2533015"/>
+            <a:ext cx="2868930" cy="645160"/>
+          </a:xfrm>
+          <a:prstGeom prst="rect">
+            <a:avLst/>
+          </a:prstGeom>
+          <a:noFill/>
+          <a:ln>
+            <a:solidFill>
+              <a:schemeClr val="tx1"/>
+            </a:solidFill>
+          </a:ln>
+        </p:spPr>
+        <p:txBody>
+          <a:bodyPr wrap="square" rtlCol="0">
+            <a:spAutoFit/>
+          </a:bodyPr>
+          <a:p>
+            <a:r>
+              <a:rPr lang="en-US" sz="1200"/>
+              <a:t>F</a:t>
+            </a:r>
+            <a:r>
+              <a:rPr lang="en-US" altLang="en-US" sz="1200"/>
+              <a:t>rom narrow uniform distributions:</a:t>
+            </a:r>
+            <a:endParaRPr lang="en-US" altLang="en-US" sz="1200"/>
+          </a:p>
+          <a:p>
+            <a:r>
+              <a:rPr lang="en-US" altLang="en-US" sz="1200" b="1">
+                <a:latin typeface="Ubuntu" panose="020B0604030602030204" charset="0"/>
+                <a:ea typeface="Ubuntu" panose="020B0604030602030204" charset="0"/>
+              </a:rPr>
+              <a:t>λ </a:t>
+            </a:r>
+            <a:r>
+              <a:rPr lang="en-US" altLang="en-US" sz="1200" b="1"/>
+              <a:t>~ </a:t>
+            </a:r>
+            <a:r>
+              <a:rPr lang="en-US" altLang="en-US" sz="1200" b="1">
+                <a:latin typeface="Ubuntu" panose="020B0604030602030204" charset="0"/>
+                <a:ea typeface="Ubuntu" panose="020B0604030602030204" charset="0"/>
+                <a:sym typeface="+mn-ea"/>
+              </a:rPr>
+              <a:t>λ </a:t>
+            </a:r>
+            <a:r>
+              <a:rPr lang="en-US" altLang="en-US" sz="1200" b="1">
+                <a:sym typeface="+mn-ea"/>
+              </a:rPr>
+              <a:t>x U(0, 0.01)</a:t>
+            </a:r>
+            <a:r>
+              <a:rPr lang="" altLang="en-US" sz="1200">
+                <a:sym typeface="+mn-ea"/>
+              </a:rPr>
+              <a:t>,</a:t>
+            </a:r>
+            <a:r>
+              <a:rPr lang="" altLang="en-US" sz="1200" b="1">
+                <a:sym typeface="+mn-ea"/>
+              </a:rPr>
+              <a:t> </a:t>
+            </a:r>
+            <a:r>
+              <a:rPr lang="en-US" altLang="en-US" sz="1200" b="1">
+                <a:latin typeface="Ubuntu" panose="020B0604030602030204" charset="0"/>
+                <a:ea typeface="Ubuntu" panose="020B0604030602030204" charset="0"/>
+                <a:sym typeface="+mn-ea"/>
+              </a:rPr>
+              <a:t>σ</a:t>
+            </a:r>
+            <a:r>
+              <a:rPr lang="en-US" altLang="en-US" sz="1200" b="1">
+                <a:latin typeface="Ubuntu" panose="020B0604030602030204" charset="0"/>
+                <a:ea typeface="Ubuntu" panose="020B0604030602030204" charset="0"/>
+                <a:sym typeface="+mn-ea"/>
+              </a:rPr>
+              <a:t> </a:t>
+            </a:r>
+            <a:r>
+              <a:rPr lang="en-US" altLang="en-US" sz="1200" b="1">
+                <a:sym typeface="+mn-ea"/>
+              </a:rPr>
+              <a:t>~ </a:t>
+            </a:r>
+            <a:r>
+              <a:rPr lang="en-US" altLang="en-US" sz="1200" b="1">
+                <a:latin typeface="Ubuntu" panose="020B0604030602030204" charset="0"/>
+                <a:ea typeface="Ubuntu" panose="020B0604030602030204" charset="0"/>
+                <a:sym typeface="+mn-ea"/>
+              </a:rPr>
+              <a:t>σ</a:t>
+            </a:r>
+            <a:r>
+              <a:rPr lang="en-US" altLang="en-US" sz="1200" b="1">
+                <a:latin typeface="Ubuntu" panose="020B0604030602030204" charset="0"/>
+                <a:ea typeface="Ubuntu" panose="020B0604030602030204" charset="0"/>
+                <a:sym typeface="+mn-ea"/>
+              </a:rPr>
+              <a:t> </a:t>
+            </a:r>
+            <a:r>
+              <a:rPr lang="en-US" altLang="en-US" sz="1200" b="1">
+                <a:sym typeface="+mn-ea"/>
+              </a:rPr>
+              <a:t>x U(0, 0.01) </a:t>
+            </a:r>
+            <a:r>
+              <a:rPr lang="en-US" altLang="en-US" sz="1200" b="1">
+                <a:sym typeface="+mn-ea"/>
+              </a:rPr>
+              <a:t> </a:t>
+            </a:r>
+            <a:r>
+              <a:rPr lang="en-US" altLang="en-US" sz="1200">
+                <a:sym typeface="+mn-ea"/>
+              </a:rPr>
+              <a:t>and </a:t>
+            </a:r>
+            <a:r>
+              <a:rPr lang="en-US" altLang="en-US" sz="1200" b="1">
+                <a:sym typeface="+mn-ea"/>
+              </a:rPr>
+              <a:t>A ~ A x U(0, 0.1)</a:t>
+            </a:r>
+            <a:endParaRPr lang="en-US" altLang="en-US" sz="1200"/>
+          </a:p>
+        </p:txBody>
+      </p:sp>
+      <p:cxnSp>
+        <p:nvCxnSpPr>
+          <p:cNvPr id="6" name="Straight Arrow Connector 5"/>
+          <p:cNvCxnSpPr/>
+          <p:nvPr/>
+        </p:nvCxnSpPr>
+        <p:spPr>
+          <a:xfrm>
+            <a:off x="2207895" y="2284730"/>
+            <a:ext cx="0" cy="198120"/>
+          </a:xfrm>
+          <a:prstGeom prst="straightConnector1">
+            <a:avLst/>
+          </a:prstGeom>
+          <a:ln w="19050">
+            <a:headEnd type="none"/>
+            <a:tailEnd type="triangle" w="med" len="med"/>
+          </a:ln>
+        </p:spPr>
+        <p:style>
+          <a:lnRef idx="1">
+            <a:schemeClr val="dk1"/>
+          </a:lnRef>
+          <a:fillRef idx="0">
+            <a:schemeClr val="dk1"/>
+          </a:fillRef>
+          <a:effectRef idx="0">
+            <a:schemeClr val="dk1"/>
+          </a:effectRef>
+          <a:fontRef idx="minor">
+            <a:schemeClr val="tx1"/>
+          </a:fontRef>
+        </p:style>
+      </p:cxnSp>
+      <p:sp>
+        <p:nvSpPr>
+          <p:cNvPr id="8" name="Text Box 7"/>
+          <p:cNvSpPr txBox="1"/>
+          <p:nvPr/>
+        </p:nvSpPr>
+        <p:spPr>
+          <a:xfrm>
+            <a:off x="1126523" y="2533305"/>
+            <a:ext cx="2166348" cy="645160"/>
+          </a:xfrm>
+          <a:prstGeom prst="rect">
+            <a:avLst/>
+          </a:prstGeom>
+          <a:solidFill>
+            <a:schemeClr val="tx1"/>
+          </a:solidFill>
+          <a:ln>
+            <a:solidFill>
+              <a:schemeClr val="tx1"/>
+            </a:solidFill>
+          </a:ln>
+        </p:spPr>
+        <p:txBody>
+          <a:bodyPr wrap="square" rtlCol="0">
+            <a:spAutoFit/>
+          </a:bodyPr>
+          <a:p>
+            <a:r>
+              <a:rPr lang="en-US" altLang="en-US" sz="1200" b="1">
+                <a:solidFill>
+                  <a:schemeClr val="bg1"/>
+                </a:solidFill>
+                <a:sym typeface="+mn-ea"/>
+              </a:rPr>
+              <a:t>Set GLE amplitudes and </a:t>
+            </a:r>
+            <a:r>
+              <a:rPr lang="en-US" sz="1200" b="1">
+                <a:solidFill>
+                  <a:schemeClr val="bg1"/>
+                </a:solidFill>
+                <a:sym typeface="+mn-ea"/>
+              </a:rPr>
+              <a:t>mean count rates f</a:t>
+            </a:r>
+            <a:r>
+              <a:rPr lang="en-US" altLang="en-US" sz="1200" b="1">
+                <a:solidFill>
+                  <a:schemeClr val="bg1"/>
+                </a:solidFill>
+                <a:sym typeface="+mn-ea"/>
+              </a:rPr>
+              <a:t>or each t</a:t>
+            </a:r>
+            <a:r>
+              <a:rPr lang="en-US" altLang="en-US" sz="1200" b="1" baseline="-25000">
+                <a:solidFill>
+                  <a:schemeClr val="bg1"/>
+                </a:solidFill>
+                <a:sym typeface="+mn-ea"/>
+              </a:rPr>
+              <a:t>0</a:t>
+            </a:r>
+            <a:r>
+              <a:rPr lang="en-US" sz="1200" b="1">
+                <a:solidFill>
+                  <a:schemeClr val="bg1"/>
+                </a:solidFill>
+                <a:sym typeface="+mn-ea"/>
+              </a:rPr>
+              <a:t> </a:t>
+            </a:r>
+            <a:endParaRPr lang="en-US" sz="1200" b="1">
+              <a:solidFill>
+                <a:schemeClr val="bg1"/>
+              </a:solidFill>
+            </a:endParaRPr>
+          </a:p>
+        </p:txBody>
+      </p:sp>
+    </p:spTree>
+  </p:cSld>
+  <p:clrMapOvr>
+    <a:masterClrMapping/>
+  </p:clrMapOvr>
+</p:sld>
+</file>
+
+<file path=ppt/slides/slide2.xml><?xml version="1.0" encoding="utf-8"?>
+<p:sld xmlns:a="http://schemas.openxmlformats.org/drawingml/2006/main" xmlns:r="http://schemas.openxmlformats.org/officeDocument/2006/relationships" xmlns:p="http://schemas.openxmlformats.org/presentationml/2006/main">
+  <p:cSld>
+    <p:spTree>
+      <p:nvGrpSpPr>
+        <p:cNvPr id="1" name=""/>
+        <p:cNvGrpSpPr/>
+        <p:nvPr/>
+      </p:nvGrpSpPr>
+      <p:grpSpPr/>
+      <p:sp>
+        <p:nvSpPr>
+          <p:cNvPr id="36" name="Rectangle 35"/>
+          <p:cNvSpPr/>
+          <p:nvPr/>
+        </p:nvSpPr>
+        <p:spPr>
+          <a:xfrm>
+            <a:off x="1122680" y="2532380"/>
+            <a:ext cx="2167890" cy="645160"/>
+          </a:xfrm>
+          <a:prstGeom prst="rect">
+            <a:avLst/>
+          </a:prstGeom>
+          <a:ln w="12700">
+            <a:solidFill>
+              <a:schemeClr val="tx1"/>
+            </a:solidFill>
+          </a:ln>
+        </p:spPr>
+        <p:style>
+          <a:lnRef idx="2">
+            <a:schemeClr val="dk1">
+              <a:shade val="50000"/>
+            </a:schemeClr>
+          </a:lnRef>
+          <a:fillRef idx="1">
+            <a:schemeClr val="dk1"/>
+          </a:fillRef>
+          <a:effectRef idx="0">
+            <a:schemeClr val="dk1"/>
+          </a:effectRef>
+          <a:fontRef idx="minor">
+            <a:schemeClr val="lt1"/>
+          </a:fontRef>
+        </p:style>
+        <p:txBody>
+          <a:bodyPr rtlCol="0" anchor="ctr"/>
+          <a:p>
+            <a:pPr algn="ctr"/>
+            <a:endParaRPr lang="en-US"/>
+          </a:p>
+        </p:txBody>
+      </p:sp>
+      <p:sp>
+        <p:nvSpPr>
+          <p:cNvPr id="4" name="Text Box 3"/>
+          <p:cNvSpPr txBox="1"/>
+          <p:nvPr/>
+        </p:nvSpPr>
+        <p:spPr>
+          <a:xfrm>
+            <a:off x="1123983" y="907070"/>
+            <a:ext cx="2166348" cy="275590"/>
+          </a:xfrm>
+          <a:prstGeom prst="rect">
+            <a:avLst/>
+          </a:prstGeom>
+          <a:solidFill>
+            <a:schemeClr val="tx1"/>
+          </a:solidFill>
+          <a:ln>
+            <a:solidFill>
+              <a:schemeClr val="tx1"/>
+            </a:solidFill>
+          </a:ln>
+        </p:spPr>
+        <p:txBody>
+          <a:bodyPr wrap="square" rtlCol="0">
+            <a:spAutoFit/>
+          </a:bodyPr>
+          <a:p>
+            <a:r>
+              <a:rPr lang="en-US" altLang="en-US" sz="1200" b="1">
+                <a:solidFill>
+                  <a:schemeClr val="bg1"/>
+                </a:solidFill>
+              </a:rPr>
+              <a:t>Set GLE times (t</a:t>
+            </a:r>
+            <a:r>
+              <a:rPr lang="en-US" altLang="en-US" sz="1200" b="1" baseline="-25000">
+                <a:solidFill>
+                  <a:schemeClr val="bg1"/>
+                </a:solidFill>
+              </a:rPr>
+              <a:t>0</a:t>
+            </a:r>
+            <a:r>
+              <a:rPr lang="en-US" altLang="en-US" sz="1200" b="1">
+                <a:solidFill>
+                  <a:schemeClr val="bg1"/>
+                </a:solidFill>
+              </a:rPr>
+              <a:t>)</a:t>
+            </a:r>
+            <a:endParaRPr lang="en-US" altLang="en-US" sz="1200" b="1">
+              <a:solidFill>
+                <a:schemeClr val="bg1"/>
+              </a:solidFill>
+            </a:endParaRPr>
+          </a:p>
+        </p:txBody>
+      </p:sp>
+      <p:sp>
+        <p:nvSpPr>
+          <p:cNvPr id="7" name="Text Box 6"/>
+          <p:cNvSpPr txBox="1"/>
+          <p:nvPr/>
+        </p:nvSpPr>
+        <p:spPr>
+          <a:xfrm>
+            <a:off x="1123348" y="2531749"/>
+            <a:ext cx="2166348" cy="580390"/>
+          </a:xfrm>
+          <a:prstGeom prst="rect">
+            <a:avLst/>
+          </a:prstGeom>
+          <a:solidFill>
+            <a:schemeClr val="tx1"/>
+          </a:solidFill>
+          <a:ln>
+            <a:solidFill>
+              <a:schemeClr val="tx1"/>
+            </a:solidFill>
+          </a:ln>
+        </p:spPr>
+        <p:txBody>
+          <a:bodyPr wrap="square" rtlCol="0">
+            <a:spAutoFit/>
+          </a:bodyPr>
+          <a:p>
+            <a:r>
+              <a:rPr lang="en-US" altLang="en-US" sz="1200" b="1">
+                <a:solidFill>
+                  <a:schemeClr val="bg1"/>
+                </a:solidFill>
+              </a:rPr>
+              <a:t>Compute each model GLE and generate data</a:t>
+            </a:r>
+            <a:endParaRPr lang="en-US" altLang="en-US" sz="1200" b="1">
+              <a:solidFill>
+                <a:schemeClr val="bg1"/>
+              </a:solidFill>
+            </a:endParaRPr>
+          </a:p>
+          <a:p>
+            <a:endParaRPr lang="en-US" altLang="en-US" sz="1200" b="1" baseline="-25000">
+              <a:solidFill>
+                <a:schemeClr val="bg1"/>
+              </a:solidFill>
+              <a:sym typeface="+mn-ea"/>
+            </a:endParaRPr>
+          </a:p>
+        </p:txBody>
+      </p:sp>
+      <p:sp>
+        <p:nvSpPr>
+          <p:cNvPr id="12" name="Text Box 11"/>
+          <p:cNvSpPr txBox="1"/>
+          <p:nvPr/>
+        </p:nvSpPr>
+        <p:spPr>
+          <a:xfrm>
+            <a:off x="85090" y="904875"/>
+            <a:ext cx="536575" cy="275590"/>
+          </a:xfrm>
+          <a:prstGeom prst="rect">
+            <a:avLst/>
+          </a:prstGeom>
+          <a:noFill/>
+          <a:ln>
+            <a:noFill/>
+          </a:ln>
+        </p:spPr>
+        <p:txBody>
+          <a:bodyPr wrap="square" rtlCol="0">
+            <a:spAutoFit/>
+          </a:bodyPr>
+          <a:p>
+            <a:pPr algn="ctr"/>
+            <a:r>
+              <a:rPr lang="en-US" altLang="en-US" sz="1200" b="1"/>
+              <a:t>N</a:t>
+            </a:r>
+            <a:r>
+              <a:rPr lang="en-US" altLang="en-US" sz="1200" b="1">
+                <a:sym typeface="+mn-ea"/>
+              </a:rPr>
+              <a:t>, T</a:t>
+            </a:r>
+            <a:r>
+              <a:rPr lang="en-US" altLang="en-US" sz="1200" b="1" baseline="-25000">
+                <a:sym typeface="+mn-ea"/>
+              </a:rPr>
+              <a:t>d</a:t>
+            </a:r>
+            <a:endParaRPr lang="en-US" altLang="en-US" sz="1200" b="1"/>
+          </a:p>
+        </p:txBody>
+      </p:sp>
+      <p:sp>
+        <p:nvSpPr>
+          <p:cNvPr id="13" name="Text Box 12"/>
+          <p:cNvSpPr txBox="1"/>
+          <p:nvPr/>
+        </p:nvSpPr>
+        <p:spPr>
+          <a:xfrm>
+            <a:off x="168910" y="3528695"/>
+            <a:ext cx="536575" cy="275590"/>
+          </a:xfrm>
+          <a:prstGeom prst="rect">
+            <a:avLst/>
+          </a:prstGeom>
+          <a:noFill/>
+          <a:ln>
+            <a:noFill/>
+          </a:ln>
+        </p:spPr>
+        <p:txBody>
+          <a:bodyPr wrap="square" rtlCol="0">
+            <a:spAutoFit/>
+          </a:bodyPr>
+          <a:p>
+            <a:pPr algn="ctr"/>
+            <a:r>
+              <a:rPr lang="en-US" altLang="en-US" sz="1200" b="1">
+                <a:latin typeface="Ubuntu" panose="020B0604030602030204" charset="0"/>
+                <a:ea typeface="Ubuntu" panose="020B0604030602030204" charset="0"/>
+                <a:sym typeface="+mn-ea"/>
+              </a:rPr>
+              <a:t>σ</a:t>
+            </a:r>
+            <a:endParaRPr lang="en-US" altLang="en-US" sz="1200" b="1"/>
+          </a:p>
+        </p:txBody>
+      </p:sp>
+      <p:sp>
+        <p:nvSpPr>
+          <p:cNvPr id="16" name="Text Box 15"/>
+          <p:cNvSpPr txBox="1"/>
+          <p:nvPr/>
+        </p:nvSpPr>
+        <p:spPr>
+          <a:xfrm>
+            <a:off x="3290570" y="907415"/>
+            <a:ext cx="2868295" cy="275590"/>
+          </a:xfrm>
+          <a:prstGeom prst="rect">
+            <a:avLst/>
+          </a:prstGeom>
+          <a:noFill/>
+          <a:ln>
+            <a:solidFill>
+              <a:schemeClr val="tx1"/>
+            </a:solidFill>
+          </a:ln>
+        </p:spPr>
+        <p:txBody>
+          <a:bodyPr wrap="square" rtlCol="0">
+            <a:spAutoFit/>
+          </a:bodyPr>
+          <a:p>
+            <a:r>
+              <a:rPr lang="en-US" altLang="en-US" sz="1200"/>
+              <a:t>From uniform distribution: </a:t>
+            </a:r>
+            <a:r>
+              <a:rPr lang="en-US" altLang="en-US" sz="1200" b="1"/>
+              <a:t>U(0,T</a:t>
+            </a:r>
+            <a:r>
+              <a:rPr lang="en-US" altLang="en-US" sz="1200" b="1" baseline="-25000"/>
+              <a:t>d</a:t>
+            </a:r>
+            <a:r>
+              <a:rPr lang="en-US" altLang="en-US" sz="1200" b="1"/>
+              <a:t>)</a:t>
+            </a:r>
+            <a:endParaRPr lang="en-US" altLang="en-US" sz="1200" b="1"/>
+          </a:p>
+        </p:txBody>
+      </p:sp>
+      <p:sp>
+        <p:nvSpPr>
+          <p:cNvPr id="17" name="Text Box 16"/>
+          <p:cNvSpPr txBox="1"/>
+          <p:nvPr/>
+        </p:nvSpPr>
+        <p:spPr>
+          <a:xfrm>
+            <a:off x="3289935" y="1536065"/>
+            <a:ext cx="2868930" cy="645160"/>
+          </a:xfrm>
+          <a:prstGeom prst="rect">
+            <a:avLst/>
+          </a:prstGeom>
+          <a:noFill/>
+          <a:ln>
+            <a:solidFill>
+              <a:schemeClr val="tx1"/>
+            </a:solidFill>
+          </a:ln>
+        </p:spPr>
+        <p:txBody>
+          <a:bodyPr wrap="square" rtlCol="0">
+            <a:spAutoFit/>
+          </a:bodyPr>
+          <a:p>
+            <a:r>
+              <a:rPr lang="en-US" sz="1200"/>
+              <a:t>F</a:t>
+            </a:r>
+            <a:r>
+              <a:rPr lang="en-US" altLang="en-US" sz="1200"/>
+              <a:t>rom uniform distribution based on Strauss et al. (2017), ensuring: </a:t>
+            </a:r>
+            <a:endParaRPr lang="en-US" altLang="en-US" sz="1200"/>
+          </a:p>
+          <a:p>
+            <a:r>
+              <a:rPr lang="en-US" altLang="en-US" sz="1200">
+                <a:latin typeface="Ubuntu" panose="020B0604030602030204" charset="0"/>
+                <a:ea typeface="Ubuntu" panose="020B0604030602030204" charset="0"/>
+                <a:sym typeface="+mn-ea"/>
+              </a:rPr>
+              <a:t>τ</a:t>
+            </a:r>
+            <a:r>
+              <a:rPr lang="en-US" altLang="en-US" sz="1200" baseline="-25000">
+                <a:latin typeface="Ubuntu" panose="020B0604030602030204" charset="0"/>
+                <a:ea typeface="Ubuntu" panose="020B0604030602030204" charset="0"/>
+                <a:sym typeface="+mn-ea"/>
+              </a:rPr>
+              <a:t>d </a:t>
+            </a:r>
+            <a:r>
+              <a:rPr lang="en-US" altLang="en-US" sz="1200">
+                <a:latin typeface="Ubuntu" panose="020B0604030602030204" charset="0"/>
+                <a:ea typeface="Ubuntu" panose="020B0604030602030204" charset="0"/>
+                <a:sym typeface="+mn-ea"/>
+              </a:rPr>
+              <a:t>&gt; 3.5 </a:t>
+            </a:r>
+            <a:r>
+              <a:rPr lang="en-US" altLang="en-US" sz="1200">
+                <a:latin typeface="Ubuntu" panose="020B0604030602030204" charset="0"/>
+                <a:ea typeface="Ubuntu" panose="020B0604030602030204" charset="0"/>
+              </a:rPr>
+              <a:t>τ</a:t>
+            </a:r>
+            <a:r>
+              <a:rPr lang="en-US" altLang="en-US" sz="1200" baseline="-25000">
+                <a:latin typeface="Ubuntu" panose="020B0604030602030204" charset="0"/>
+                <a:ea typeface="Ubuntu" panose="020B0604030602030204" charset="0"/>
+              </a:rPr>
+              <a:t>r</a:t>
+            </a:r>
+            <a:r>
+              <a:rPr lang="en-US" altLang="en-US" sz="1200">
+                <a:latin typeface="Ubuntu" panose="020B0604030602030204" charset="0"/>
+                <a:ea typeface="Ubuntu" panose="020B0604030602030204" charset="0"/>
+              </a:rPr>
+              <a:t> </a:t>
+            </a:r>
+            <a:endParaRPr lang="en-US" altLang="en-US" sz="1200"/>
+          </a:p>
+        </p:txBody>
+      </p:sp>
+      <p:sp>
+        <p:nvSpPr>
+          <p:cNvPr id="20" name="Text Box 19"/>
+          <p:cNvSpPr txBox="1"/>
+          <p:nvPr/>
+        </p:nvSpPr>
+        <p:spPr>
+          <a:xfrm>
+            <a:off x="3289935" y="2531745"/>
+            <a:ext cx="2868295" cy="645160"/>
+          </a:xfrm>
+          <a:prstGeom prst="rect">
+            <a:avLst/>
+          </a:prstGeom>
+          <a:noFill/>
+          <a:ln>
+            <a:solidFill>
+              <a:schemeClr val="tx1"/>
+            </a:solidFill>
+          </a:ln>
+          <a:extLst>
+            <a:ext uri="{909E8E84-426E-40DD-AFC4-6F175D3DCCD1}">
+              <a14:hiddenFill xmlns:a14="http://schemas.microsoft.com/office/drawing/2010/main">
+                <a:solidFill>
+                  <a:schemeClr val="tx1"/>
+                </a:solidFill>
+              </a14:hiddenFill>
+            </a:ext>
+          </a:extLst>
+        </p:spPr>
+        <p:txBody>
+          <a:bodyPr wrap="square" rtlCol="0">
+            <a:spAutoFit/>
+          </a:bodyPr>
+          <a:p>
+            <a:r>
+              <a:rPr lang="en-US" altLang="en-US" sz="1200">
+                <a:solidFill>
+                  <a:schemeClr val="tx1"/>
+                </a:solidFill>
+              </a:rPr>
+              <a:t>For each datapoint in the model, draw simulated data from Poisson distribution: </a:t>
+            </a:r>
+            <a:r>
+              <a:rPr lang="en-US" altLang="en-US" sz="1200" b="1">
+                <a:solidFill>
+                  <a:schemeClr val="tx1"/>
+                </a:solidFill>
+              </a:rPr>
+              <a:t>Po(x)</a:t>
+            </a:r>
+            <a:endParaRPr lang="en-US" altLang="en-US" sz="1200" b="1" baseline="-25000">
+              <a:solidFill>
+                <a:schemeClr val="tx1"/>
+              </a:solidFill>
+              <a:sym typeface="+mn-ea"/>
+            </a:endParaRPr>
+          </a:p>
+        </p:txBody>
+      </p:sp>
+      <p:sp>
+        <p:nvSpPr>
+          <p:cNvPr id="23" name="Text Box 22"/>
+          <p:cNvSpPr txBox="1"/>
+          <p:nvPr/>
+        </p:nvSpPr>
+        <p:spPr>
+          <a:xfrm>
+            <a:off x="2473358" y="4361913"/>
+            <a:ext cx="2166348" cy="460375"/>
+          </a:xfrm>
+          <a:prstGeom prst="rect">
+            <a:avLst/>
+          </a:prstGeom>
+          <a:solidFill>
+            <a:schemeClr val="tx1"/>
+          </a:solidFill>
+          <a:ln>
+            <a:solidFill>
+              <a:schemeClr val="tx1"/>
+            </a:solidFill>
+          </a:ln>
+        </p:spPr>
+        <p:txBody>
+          <a:bodyPr wrap="square" rtlCol="0">
+            <a:spAutoFit/>
+          </a:bodyPr>
+          <a:p>
+            <a:pPr algn="ctr"/>
+            <a:r>
+              <a:rPr lang="en-US" altLang="en-US" sz="1200" b="1">
+                <a:solidFill>
+                  <a:schemeClr val="bg1"/>
+                </a:solidFill>
+              </a:rPr>
+              <a:t>Run statistics tests on each time-series</a:t>
+            </a:r>
+            <a:endParaRPr lang="en-US" altLang="en-US" sz="1200" b="1">
+              <a:solidFill>
+                <a:schemeClr val="bg1"/>
+              </a:solidFill>
+            </a:endParaRPr>
+          </a:p>
+        </p:txBody>
+      </p:sp>
+      <p:cxnSp>
+        <p:nvCxnSpPr>
+          <p:cNvPr id="24" name="Straight Arrow Connector 23"/>
+          <p:cNvCxnSpPr/>
+          <p:nvPr/>
+        </p:nvCxnSpPr>
+        <p:spPr>
+          <a:xfrm>
+            <a:off x="561340" y="1041400"/>
+            <a:ext cx="546100" cy="0"/>
+          </a:xfrm>
+          <a:prstGeom prst="straightConnector1">
+            <a:avLst/>
+          </a:prstGeom>
+          <a:ln w="19050">
+            <a:headEnd type="none"/>
+            <a:tailEnd type="triangle" w="med" len="med"/>
+          </a:ln>
+        </p:spPr>
+        <p:style>
+          <a:lnRef idx="1">
+            <a:schemeClr val="dk1"/>
+          </a:lnRef>
+          <a:fillRef idx="0">
+            <a:schemeClr val="dk1"/>
+          </a:fillRef>
+          <a:effectRef idx="0">
+            <a:schemeClr val="dk1"/>
+          </a:effectRef>
+          <a:fontRef idx="minor">
+            <a:schemeClr val="tx1"/>
+          </a:fontRef>
+        </p:style>
+      </p:cxnSp>
+      <p:cxnSp>
+        <p:nvCxnSpPr>
+          <p:cNvPr id="25" name="Straight Arrow Connector 24"/>
+          <p:cNvCxnSpPr/>
+          <p:nvPr/>
+        </p:nvCxnSpPr>
+        <p:spPr>
+          <a:xfrm>
+            <a:off x="630555" y="3664585"/>
+            <a:ext cx="476885" cy="3810"/>
+          </a:xfrm>
+          <a:prstGeom prst="straightConnector1">
+            <a:avLst/>
+          </a:prstGeom>
+          <a:ln w="19050">
+            <a:headEnd type="none"/>
+            <a:tailEnd type="triangle" w="med" len="med"/>
+          </a:ln>
+        </p:spPr>
+        <p:style>
+          <a:lnRef idx="1">
+            <a:schemeClr val="dk1"/>
+          </a:lnRef>
+          <a:fillRef idx="0">
+            <a:schemeClr val="dk1"/>
+          </a:fillRef>
+          <a:effectRef idx="0">
+            <a:schemeClr val="dk1"/>
+          </a:effectRef>
+          <a:fontRef idx="minor">
+            <a:schemeClr val="tx1"/>
+          </a:fontRef>
+        </p:style>
+      </p:cxnSp>
+      <p:cxnSp>
+        <p:nvCxnSpPr>
+          <p:cNvPr id="28" name="Straight Arrow Connector 27"/>
+          <p:cNvCxnSpPr/>
+          <p:nvPr/>
+        </p:nvCxnSpPr>
+        <p:spPr>
+          <a:xfrm>
+            <a:off x="2207260" y="1287780"/>
+            <a:ext cx="0" cy="198120"/>
+          </a:xfrm>
+          <a:prstGeom prst="straightConnector1">
+            <a:avLst/>
+          </a:prstGeom>
+          <a:ln w="19050">
+            <a:headEnd type="none"/>
+            <a:tailEnd type="triangle" w="med" len="med"/>
+          </a:ln>
+        </p:spPr>
+        <p:style>
+          <a:lnRef idx="1">
+            <a:schemeClr val="dk1"/>
+          </a:lnRef>
+          <a:fillRef idx="0">
+            <a:schemeClr val="dk1"/>
+          </a:fillRef>
+          <a:effectRef idx="0">
+            <a:schemeClr val="dk1"/>
+          </a:effectRef>
+          <a:fontRef idx="minor">
+            <a:schemeClr val="tx1"/>
+          </a:fontRef>
+        </p:style>
+      </p:cxnSp>
+      <p:sp>
+        <p:nvSpPr>
+          <p:cNvPr id="32" name="Rectangle 31"/>
+          <p:cNvSpPr/>
+          <p:nvPr/>
+        </p:nvSpPr>
+        <p:spPr>
+          <a:xfrm>
+            <a:off x="733425" y="716280"/>
+            <a:ext cx="5646420" cy="3256280"/>
+          </a:xfrm>
+          <a:prstGeom prst="rect">
+            <a:avLst/>
+          </a:prstGeom>
+          <a:noFill/>
+          <a:ln w="19050"/>
+          <a:extLst>
+            <a:ext uri="{909E8E84-426E-40DD-AFC4-6F175D3DCCD1}">
+              <a14:hiddenFill xmlns:a14="http://schemas.microsoft.com/office/drawing/2010/main">
+                <a:solidFill>
+                  <a:schemeClr val="lt1"/>
+                </a:solidFill>
+              </a14:hiddenFill>
+            </a:ext>
+          </a:extLst>
+        </p:spPr>
+        <p:style>
+          <a:lnRef idx="2">
+            <a:schemeClr val="dk1"/>
+          </a:lnRef>
+          <a:fillRef idx="1">
+            <a:schemeClr val="lt1"/>
+          </a:fillRef>
+          <a:effectRef idx="0">
+            <a:schemeClr val="dk1"/>
+          </a:effectRef>
+          <a:fontRef idx="minor">
+            <a:schemeClr val="dk1"/>
+          </a:fontRef>
+        </p:style>
+        <p:txBody>
+          <a:bodyPr rtlCol="0" anchor="ctr"/>
+          <a:p>
+            <a:pPr algn="ctr"/>
+            <a:endParaRPr lang="en-US"/>
+          </a:p>
+        </p:txBody>
+      </p:sp>
+      <p:cxnSp>
+        <p:nvCxnSpPr>
+          <p:cNvPr id="33" name="Straight Arrow Connector 32"/>
+          <p:cNvCxnSpPr/>
+          <p:nvPr/>
+        </p:nvCxnSpPr>
+        <p:spPr>
+          <a:xfrm flipH="1">
+            <a:off x="3557905" y="4086860"/>
+            <a:ext cx="4445" cy="213360"/>
+          </a:xfrm>
+          <a:prstGeom prst="straightConnector1">
+            <a:avLst/>
+          </a:prstGeom>
+          <a:ln w="19050">
+            <a:headEnd type="none"/>
+            <a:tailEnd type="triangle" w="med" len="med"/>
+          </a:ln>
+        </p:spPr>
+        <p:style>
+          <a:lnRef idx="1">
+            <a:schemeClr val="dk1"/>
+          </a:lnRef>
+          <a:fillRef idx="0">
+            <a:schemeClr val="dk1"/>
+          </a:fillRef>
+          <a:effectRef idx="0">
+            <a:schemeClr val="dk1"/>
+          </a:effectRef>
+          <a:fontRef idx="minor">
+            <a:schemeClr val="tx1"/>
+          </a:fontRef>
+        </p:style>
+      </p:cxnSp>
+      <p:sp>
+        <p:nvSpPr>
+          <p:cNvPr id="2" name="Text Box 1"/>
+          <p:cNvSpPr txBox="1"/>
+          <p:nvPr/>
+        </p:nvSpPr>
+        <p:spPr>
+          <a:xfrm>
+            <a:off x="1125888" y="1536355"/>
+            <a:ext cx="2166348" cy="645160"/>
+          </a:xfrm>
+          <a:prstGeom prst="rect">
+            <a:avLst/>
+          </a:prstGeom>
+          <a:solidFill>
+            <a:schemeClr val="tx1"/>
+          </a:solidFill>
+          <a:ln>
+            <a:solidFill>
+              <a:schemeClr val="tx1"/>
+            </a:solidFill>
+          </a:ln>
+        </p:spPr>
+        <p:txBody>
+          <a:bodyPr wrap="square" rtlCol="0">
+            <a:spAutoFit/>
+          </a:bodyPr>
+          <a:p>
+            <a:r>
+              <a:rPr lang="en-US" altLang="en-US" sz="1200" b="1">
+                <a:solidFill>
+                  <a:schemeClr val="bg1"/>
+                </a:solidFill>
+                <a:sym typeface="+mn-ea"/>
+              </a:rPr>
+              <a:t>Set rise and decay times for each</a:t>
+            </a:r>
+            <a:r>
+              <a:rPr lang="en-US" altLang="en-US" sz="1200" b="1">
+                <a:solidFill>
+                  <a:schemeClr val="bg1"/>
+                </a:solidFill>
+              </a:rPr>
+              <a:t> t</a:t>
+            </a:r>
+            <a:r>
+              <a:rPr lang="en-US" altLang="en-US" sz="1200" b="1" baseline="-25000">
+                <a:solidFill>
+                  <a:schemeClr val="bg1"/>
+                </a:solidFill>
+              </a:rPr>
+              <a:t>0</a:t>
+            </a:r>
+            <a:endParaRPr lang="en-US" altLang="en-US" sz="1200" b="1">
+              <a:solidFill>
+                <a:schemeClr val="bg1"/>
+              </a:solidFill>
+            </a:endParaRPr>
+          </a:p>
+          <a:p>
+            <a:endParaRPr lang="en-US" altLang="en-US" sz="1200" b="1">
+              <a:solidFill>
+                <a:schemeClr val="bg1"/>
+              </a:solidFill>
+            </a:endParaRPr>
+          </a:p>
+        </p:txBody>
+      </p:sp>
+      <p:sp>
+        <p:nvSpPr>
+          <p:cNvPr id="3" name="Text Box 2"/>
+          <p:cNvSpPr txBox="1"/>
+          <p:nvPr/>
+        </p:nvSpPr>
+        <p:spPr>
+          <a:xfrm>
+            <a:off x="1122045" y="3528695"/>
+            <a:ext cx="2168525" cy="275590"/>
+          </a:xfrm>
+          <a:prstGeom prst="rect">
+            <a:avLst/>
+          </a:prstGeom>
+          <a:solidFill>
+            <a:schemeClr val="tx1"/>
+          </a:solidFill>
+          <a:ln>
+            <a:solidFill>
+              <a:schemeClr val="tx1"/>
+            </a:solidFill>
+          </a:ln>
+        </p:spPr>
+        <p:txBody>
+          <a:bodyPr wrap="square" rtlCol="0">
+            <a:spAutoFit/>
+          </a:bodyPr>
+          <a:p>
+            <a:r>
+              <a:rPr lang="en-US" altLang="en-US" sz="1200" b="1">
+                <a:solidFill>
+                  <a:schemeClr val="bg1"/>
+                </a:solidFill>
+              </a:rPr>
+              <a:t>Add noise to each data set</a:t>
+            </a:r>
+            <a:endParaRPr lang="en-US" altLang="en-US" sz="1200" b="1" baseline="-25000">
+              <a:solidFill>
+                <a:schemeClr val="bg1"/>
+              </a:solidFill>
+              <a:sym typeface="+mn-ea"/>
+            </a:endParaRPr>
+          </a:p>
+        </p:txBody>
+      </p:sp>
+      <p:sp>
+        <p:nvSpPr>
+          <p:cNvPr id="9" name="Text Box 8"/>
+          <p:cNvSpPr txBox="1"/>
+          <p:nvPr/>
+        </p:nvSpPr>
+        <p:spPr>
+          <a:xfrm>
+            <a:off x="3290570" y="3528695"/>
+            <a:ext cx="2868930" cy="275590"/>
+          </a:xfrm>
+          <a:prstGeom prst="rect">
+            <a:avLst/>
+          </a:prstGeom>
+          <a:noFill/>
+          <a:ln>
+            <a:solidFill>
+              <a:schemeClr val="tx1"/>
+            </a:solidFill>
+          </a:ln>
+        </p:spPr>
+        <p:txBody>
+          <a:bodyPr wrap="square" rtlCol="0">
+            <a:spAutoFit/>
+          </a:bodyPr>
+          <a:p>
+            <a:r>
+              <a:rPr lang="en-US" altLang="en-US" sz="1200"/>
+              <a:t>Drawn from Poisson distribution</a:t>
+            </a:r>
+            <a:r>
+              <a:rPr lang="en-US" altLang="en-US" sz="1200">
+                <a:sym typeface="+mn-ea"/>
+              </a:rPr>
+              <a:t>: </a:t>
+            </a:r>
+            <a:r>
+              <a:rPr lang="en-US" altLang="en-US" sz="1200" b="1">
+                <a:sym typeface="+mn-ea"/>
+              </a:rPr>
+              <a:t>Po(</a:t>
+            </a:r>
+            <a:r>
+              <a:rPr lang="en-US" altLang="en-US" sz="1200" b="1">
+                <a:latin typeface="Ubuntu" panose="020B0604030602030204" charset="0"/>
+                <a:ea typeface="Ubuntu" panose="020B0604030602030204" charset="0"/>
+                <a:sym typeface="+mn-ea"/>
+              </a:rPr>
+              <a:t>σ</a:t>
+            </a:r>
+            <a:r>
+              <a:rPr lang="en-US" altLang="en-US" sz="1200" b="1">
+                <a:sym typeface="+mn-ea"/>
+              </a:rPr>
+              <a:t>)</a:t>
+            </a:r>
+            <a:endParaRPr lang="en-US" altLang="en-US" sz="1200"/>
+          </a:p>
+        </p:txBody>
+      </p:sp>
+      <p:cxnSp>
+        <p:nvCxnSpPr>
+          <p:cNvPr id="30" name="Straight Arrow Connector 29"/>
+          <p:cNvCxnSpPr/>
+          <p:nvPr/>
+        </p:nvCxnSpPr>
+        <p:spPr>
+          <a:xfrm>
+            <a:off x="2207260" y="2286000"/>
+            <a:ext cx="0" cy="198120"/>
+          </a:xfrm>
+          <a:prstGeom prst="straightConnector1">
+            <a:avLst/>
+          </a:prstGeom>
+          <a:ln w="19050">
+            <a:headEnd type="none"/>
+            <a:tailEnd type="triangle" w="med" len="med"/>
+          </a:ln>
+        </p:spPr>
+        <p:style>
+          <a:lnRef idx="1">
+            <a:schemeClr val="dk1"/>
+          </a:lnRef>
+          <a:fillRef idx="0">
+            <a:schemeClr val="dk1"/>
+          </a:fillRef>
+          <a:effectRef idx="0">
+            <a:schemeClr val="dk1"/>
+          </a:effectRef>
+          <a:fontRef idx="minor">
+            <a:schemeClr val="tx1"/>
+          </a:fontRef>
+        </p:style>
+      </p:cxnSp>
+      <p:cxnSp>
+        <p:nvCxnSpPr>
+          <p:cNvPr id="31" name="Straight Arrow Connector 30"/>
+          <p:cNvCxnSpPr/>
+          <p:nvPr/>
+        </p:nvCxnSpPr>
+        <p:spPr>
+          <a:xfrm>
+            <a:off x="2207260" y="3282315"/>
+            <a:ext cx="0" cy="198120"/>
+          </a:xfrm>
+          <a:prstGeom prst="straightConnector1">
+            <a:avLst/>
+          </a:prstGeom>
+          <a:ln w="19050">
+            <a:headEnd type="none"/>
+            <a:tailEnd type="triangle" w="med" len="med"/>
+          </a:ln>
+        </p:spPr>
+        <p:style>
+          <a:lnRef idx="1">
+            <a:schemeClr val="dk1"/>
+          </a:lnRef>
+          <a:fillRef idx="0">
+            <a:schemeClr val="dk1"/>
+          </a:fillRef>
+          <a:effectRef idx="0">
+            <a:schemeClr val="dk1"/>
+          </a:effectRef>
+          <a:fontRef idx="minor">
+            <a:schemeClr val="tx1"/>
+          </a:fontRef>
+        </p:style>
+      </p:cxnSp>
+      <p:sp>
+        <p:nvSpPr>
+          <p:cNvPr id="10" name="Text Box 9"/>
+          <p:cNvSpPr txBox="1"/>
+          <p:nvPr/>
+        </p:nvSpPr>
+        <p:spPr>
+          <a:xfrm>
+            <a:off x="168910" y="2684145"/>
+            <a:ext cx="536575" cy="275590"/>
+          </a:xfrm>
+          <a:prstGeom prst="rect">
+            <a:avLst/>
+          </a:prstGeom>
+          <a:noFill/>
+          <a:ln>
+            <a:noFill/>
+          </a:ln>
+        </p:spPr>
+        <p:txBody>
+          <a:bodyPr wrap="square" rtlCol="0">
+            <a:spAutoFit/>
+          </a:bodyPr>
+          <a:p>
+            <a:pPr algn="ctr"/>
+            <a:r>
+              <a:rPr lang="en-US" altLang="en-US" sz="1200" b="1">
+                <a:latin typeface="Ubuntu" panose="020B0604030602030204" charset="0"/>
+                <a:ea typeface="Ubuntu" panose="020B0604030602030204" charset="0"/>
+              </a:rPr>
+              <a:t>λ</a:t>
+            </a:r>
+            <a:r>
+              <a:rPr lang="en-US" altLang="en-US" sz="1200" b="1"/>
+              <a:t>, A, </a:t>
+            </a:r>
+            <a:endParaRPr lang="en-US" altLang="en-US" sz="1200" b="1"/>
+          </a:p>
+        </p:txBody>
+      </p:sp>
+      <p:cxnSp>
+        <p:nvCxnSpPr>
+          <p:cNvPr id="11" name="Straight Arrow Connector 10"/>
+          <p:cNvCxnSpPr/>
+          <p:nvPr/>
+        </p:nvCxnSpPr>
+        <p:spPr>
+          <a:xfrm>
+            <a:off x="621665" y="2853055"/>
+            <a:ext cx="476885" cy="3810"/>
           </a:xfrm>
           <a:prstGeom prst="straightConnector1">
             <a:avLst/>

</xml_diff>